<commit_message>
weghalen void in syll h1
</commit_message>
<xml_diff>
--- a/presentatie les1.pptx
+++ b/presentatie les1.pptx
@@ -18,6 +18,8 @@
     <p:sldId id="264" r:id="rId12"/>
     <p:sldId id="266" r:id="rId13"/>
     <p:sldId id="268" r:id="rId14"/>
+    <p:sldId id="269" r:id="rId15"/>
+    <p:sldId id="270" r:id="rId16"/>
   </p:sldIdLst>
   <p:sldSz cx="9144000" cy="6858000" type="screen4x3"/>
   <p:notesSz cx="6858000" cy="9144000"/>
@@ -335,7 +337,7 @@
           <a:p>
             <a:fld id="{A4A6734C-E115-4BC5-9FB0-F9BF6FABFDA0}" type="datetimeFigureOut">
               <a:rPr lang="en-US" smtClean="0"/>
-              <a:t>29-08-16</a:t>
+              <a:t>05-09-16</a:t>
             </a:fld>
             <a:endParaRPr lang="en-US"/>
           </a:p>
@@ -587,7 +589,7 @@
           <a:p>
             <a:fld id="{A4A6734C-E115-4BC5-9FB0-F9BF6FABFDA0}" type="datetimeFigureOut">
               <a:rPr lang="en-US" smtClean="0"/>
-              <a:t>29-08-16</a:t>
+              <a:t>05-09-16</a:t>
             </a:fld>
             <a:endParaRPr lang="en-US"/>
           </a:p>
@@ -986,7 +988,7 @@
           <a:p>
             <a:fld id="{A4A6734C-E115-4BC5-9FB0-F9BF6FABFDA0}" type="datetimeFigureOut">
               <a:rPr lang="en-US" smtClean="0"/>
-              <a:t>29-08-16</a:t>
+              <a:t>05-09-16</a:t>
             </a:fld>
             <a:endParaRPr lang="en-US"/>
           </a:p>
@@ -1385,7 +1387,7 @@
           <a:p>
             <a:fld id="{A4A6734C-E115-4BC5-9FB0-F9BF6FABFDA0}" type="datetimeFigureOut">
               <a:rPr lang="en-US" smtClean="0"/>
-              <a:t>29-08-16</a:t>
+              <a:t>05-09-16</a:t>
             </a:fld>
             <a:endParaRPr lang="en-US"/>
           </a:p>
@@ -1838,7 +1840,7 @@
           <a:p>
             <a:fld id="{A4A6734C-E115-4BC5-9FB0-F9BF6FABFDA0}" type="datetimeFigureOut">
               <a:rPr lang="en-US" smtClean="0"/>
-              <a:t>29-08-16</a:t>
+              <a:t>05-09-16</a:t>
             </a:fld>
             <a:endParaRPr lang="en-US"/>
           </a:p>
@@ -2393,7 +2395,7 @@
           <a:p>
             <a:fld id="{A4A6734C-E115-4BC5-9FB0-F9BF6FABFDA0}" type="datetimeFigureOut">
               <a:rPr lang="en-US" smtClean="0"/>
-              <a:t>29-08-16</a:t>
+              <a:t>05-09-16</a:t>
             </a:fld>
             <a:endParaRPr lang="en-US"/>
           </a:p>
@@ -3082,7 +3084,7 @@
           <a:p>
             <a:fld id="{A4A6734C-E115-4BC5-9FB0-F9BF6FABFDA0}" type="datetimeFigureOut">
               <a:rPr lang="en-US" smtClean="0"/>
-              <a:t>29-08-16</a:t>
+              <a:t>05-09-16</a:t>
             </a:fld>
             <a:endParaRPr lang="en-US"/>
           </a:p>
@@ -3296,7 +3298,7 @@
           <a:p>
             <a:fld id="{A4A6734C-E115-4BC5-9FB0-F9BF6FABFDA0}" type="datetimeFigureOut">
               <a:rPr lang="en-US" smtClean="0"/>
-              <a:t>29-08-16</a:t>
+              <a:t>05-09-16</a:t>
             </a:fld>
             <a:endParaRPr lang="en-US"/>
           </a:p>
@@ -3496,7 +3498,7 @@
           <a:p>
             <a:fld id="{A4A6734C-E115-4BC5-9FB0-F9BF6FABFDA0}" type="datetimeFigureOut">
               <a:rPr lang="en-US" smtClean="0"/>
-              <a:t>29-08-16</a:t>
+              <a:t>05-09-16</a:t>
             </a:fld>
             <a:endParaRPr lang="en-US"/>
           </a:p>
@@ -3799,7 +3801,7 @@
           <a:p>
             <a:fld id="{A4A6734C-E115-4BC5-9FB0-F9BF6FABFDA0}" type="datetimeFigureOut">
               <a:rPr lang="en-US" smtClean="0"/>
-              <a:t>29-08-16</a:t>
+              <a:t>05-09-16</a:t>
             </a:fld>
             <a:endParaRPr lang="en-US"/>
           </a:p>
@@ -4420,7 +4422,7 @@
           <a:p>
             <a:fld id="{A4A6734C-E115-4BC5-9FB0-F9BF6FABFDA0}" type="datetimeFigureOut">
               <a:rPr lang="en-US" smtClean="0"/>
-              <a:t>29-08-16</a:t>
+              <a:t>05-09-16</a:t>
             </a:fld>
             <a:endParaRPr lang="en-US"/>
           </a:p>
@@ -4749,7 +4751,7 @@
           <a:p>
             <a:fld id="{A4A6734C-E115-4BC5-9FB0-F9BF6FABFDA0}" type="datetimeFigureOut">
               <a:rPr lang="en-US" smtClean="0"/>
-              <a:t>29-08-16</a:t>
+              <a:t>05-09-16</a:t>
             </a:fld>
             <a:endParaRPr lang="en-US"/>
           </a:p>
@@ -5222,7 +5224,7 @@
           <a:p>
             <a:fld id="{A4A6734C-E115-4BC5-9FB0-F9BF6FABFDA0}" type="datetimeFigureOut">
               <a:rPr lang="en-US" smtClean="0"/>
-              <a:t>29-08-16</a:t>
+              <a:t>05-09-16</a:t>
             </a:fld>
             <a:endParaRPr lang="en-US"/>
           </a:p>
@@ -5366,7 +5368,7 @@
           <a:p>
             <a:fld id="{A4A6734C-E115-4BC5-9FB0-F9BF6FABFDA0}" type="datetimeFigureOut">
               <a:rPr lang="en-US" smtClean="0"/>
-              <a:t>29-08-16</a:t>
+              <a:t>05-09-16</a:t>
             </a:fld>
             <a:endParaRPr lang="en-US"/>
           </a:p>
@@ -5456,7 +5458,7 @@
           <a:p>
             <a:fld id="{A4A6734C-E115-4BC5-9FB0-F9BF6FABFDA0}" type="datetimeFigureOut">
               <a:rPr lang="en-US" smtClean="0"/>
-              <a:t>29-08-16</a:t>
+              <a:t>05-09-16</a:t>
             </a:fld>
             <a:endParaRPr lang="en-US"/>
           </a:p>
@@ -5737,7 +5739,7 @@
           <a:p>
             <a:fld id="{A4A6734C-E115-4BC5-9FB0-F9BF6FABFDA0}" type="datetimeFigureOut">
               <a:rPr lang="en-US" smtClean="0"/>
-              <a:t>29-08-16</a:t>
+              <a:t>05-09-16</a:t>
             </a:fld>
             <a:endParaRPr lang="en-US"/>
           </a:p>
@@ -6033,7 +6035,7 @@
           <a:p>
             <a:fld id="{A4A6734C-E115-4BC5-9FB0-F9BF6FABFDA0}" type="datetimeFigureOut">
               <a:rPr lang="en-US" smtClean="0"/>
-              <a:t>29-08-16</a:t>
+              <a:t>05-09-16</a:t>
             </a:fld>
             <a:endParaRPr lang="en-US"/>
           </a:p>
@@ -6425,11 +6427,7 @@
           <a:p>
             <a:r>
               <a:rPr lang="nl-NL" dirty="0" smtClean="0"/>
-              <a:t>Intro</a:t>
-            </a:r>
-            <a:r>
-              <a:rPr lang="nl-NL" dirty="0" smtClean="0"/>
-              <a:t> Programmeren en Mobile </a:t>
+              <a:t>Intro Programmeren en Mobile </a:t>
             </a:r>
             <a:r>
               <a:rPr lang="nl-NL" dirty="0" err="1" smtClean="0"/>
@@ -6487,6 +6485,13 @@
   <p:clrMapOvr>
     <a:masterClrMapping/>
   </p:clrMapOvr>
+  <p:timing>
+    <p:tnLst>
+      <p:par>
+        <p:cTn xmlns:p14="http://schemas.microsoft.com/office/powerpoint/2010/main" id="1" dur="indefinite" restart="never" nodeType="tmRoot"/>
+      </p:par>
+    </p:tnLst>
+  </p:timing>
 </p:sld>
 </file>
 
@@ -6629,21 +6634,117 @@
         </p:nvSpPr>
         <p:spPr/>
         <p:txBody>
-          <a:bodyPr/>
+          <a:bodyPr>
+            <a:normAutofit fontScale="92500" lnSpcReduction="10000"/>
+          </a:bodyPr>
           <a:lstStyle/>
           <a:p>
             <a:r>
-              <a:rPr lang="nl-NL" dirty="0" err="1"/>
-              <a:t>https</a:t>
+              <a:rPr lang="nl-NL" dirty="0" smtClean="0"/>
+              <a:t>Doe de volgende tutorial: </a:t>
+            </a:r>
+            <a:r>
+              <a:rPr lang="nl-NL" dirty="0">
+                <a:hlinkClick r:id="rId2"/>
+              </a:rPr>
+              <a:t>https://</a:t>
+            </a:r>
+            <a:r>
+              <a:rPr lang="nl-NL" dirty="0" smtClean="0">
+                <a:hlinkClick r:id="rId2"/>
+              </a:rPr>
+              <a:t>try.github.io</a:t>
+            </a:r>
+            <a:endParaRPr lang="nl-NL" dirty="0" smtClean="0"/>
+          </a:p>
+          <a:p>
+            <a:r>
+              <a:rPr lang="nl-NL" dirty="0" smtClean="0"/>
+              <a:t>Lees de </a:t>
             </a:r>
             <a:r>
               <a:rPr lang="nl-NL" dirty="0"/>
-              <a:t>://</a:t>
-            </a:r>
-            <a:r>
-              <a:rPr lang="nl-NL" dirty="0" err="1"/>
-              <a:t>try.github.io</a:t>
-            </a:r>
+              <a:t>volgende site </a:t>
+            </a:r>
+            <a:r>
+              <a:rPr lang="nl-NL" dirty="0">
+                <a:hlinkClick r:id="rId3"/>
+              </a:rPr>
+              <a:t>http://rogerdudler.github.io/git-guide/</a:t>
+            </a:r>
+            <a:r>
+              <a:rPr lang="nl-NL" dirty="0" smtClean="0">
+                <a:hlinkClick r:id="rId3"/>
+              </a:rPr>
+              <a:t>index.nl.html</a:t>
+            </a:r>
+            <a:endParaRPr lang="nl-NL" dirty="0" smtClean="0"/>
+          </a:p>
+          <a:p>
+            <a:r>
+              <a:rPr lang="nl-NL" dirty="0" smtClean="0"/>
+              <a:t>Maak een </a:t>
+            </a:r>
+            <a:r>
+              <a:rPr lang="nl-NL" dirty="0" err="1" smtClean="0"/>
+              <a:t>github</a:t>
+            </a:r>
+            <a:r>
+              <a:rPr lang="nl-NL" dirty="0" smtClean="0"/>
+              <a:t> account op </a:t>
+            </a:r>
+            <a:r>
+              <a:rPr lang="nl-NL" dirty="0" err="1" smtClean="0"/>
+              <a:t>github.com</a:t>
+            </a:r>
+            <a:endParaRPr lang="nl-NL" dirty="0" smtClean="0"/>
+          </a:p>
+          <a:p>
+            <a:r>
+              <a:rPr lang="nl-NL" dirty="0" smtClean="0"/>
+              <a:t>Maak een </a:t>
+            </a:r>
+            <a:r>
+              <a:rPr lang="nl-NL" dirty="0" err="1" smtClean="0"/>
+              <a:t>repository</a:t>
+            </a:r>
+            <a:r>
+              <a:rPr lang="nl-NL" dirty="0" smtClean="0"/>
+              <a:t> aan</a:t>
+            </a:r>
+          </a:p>
+          <a:p>
+            <a:r>
+              <a:rPr lang="nl-NL" dirty="0" smtClean="0"/>
+              <a:t>Setup Git op je computer</a:t>
+            </a:r>
+          </a:p>
+          <a:p>
+            <a:r>
+              <a:rPr lang="nl-NL" dirty="0" smtClean="0"/>
+              <a:t>Maak een file aan op je computer en push deze naar de </a:t>
+            </a:r>
+            <a:r>
+              <a:rPr lang="nl-NL" dirty="0" err="1" smtClean="0"/>
+              <a:t>github</a:t>
+            </a:r>
+            <a:r>
+              <a:rPr lang="nl-NL" dirty="0" smtClean="0"/>
+              <a:t> </a:t>
+            </a:r>
+            <a:r>
+              <a:rPr lang="nl-NL" dirty="0" err="1" smtClean="0"/>
+              <a:t>repository</a:t>
+            </a:r>
+            <a:endParaRPr lang="nl-NL" dirty="0" smtClean="0"/>
+          </a:p>
+          <a:p>
+            <a:pPr marL="0" indent="0">
+              <a:buNone/>
+            </a:pPr>
+            <a:endParaRPr lang="nl-NL" dirty="0" smtClean="0"/>
+          </a:p>
+          <a:p>
             <a:endParaRPr lang="nl-NL" dirty="0"/>
           </a:p>
         </p:txBody>
@@ -6848,7 +6949,9 @@
         </p:nvSpPr>
         <p:spPr/>
         <p:txBody>
-          <a:bodyPr/>
+          <a:bodyPr>
+            <a:normAutofit/>
+          </a:bodyPr>
           <a:lstStyle/>
           <a:p>
             <a:r>
@@ -6859,7 +6962,15 @@
           <a:p>
             <a:r>
               <a:rPr lang="nl-NL" dirty="0" smtClean="0"/>
-              <a:t>1) maak </a:t>
+              <a:t>1) </a:t>
+            </a:r>
+            <a:r>
+              <a:rPr lang="nl-NL" dirty="0"/>
+              <a:t>S</a:t>
+            </a:r>
+            <a:r>
+              <a:rPr lang="nl-NL" dirty="0" smtClean="0"/>
+              <a:t>tuur link van je </a:t>
             </a:r>
             <a:r>
               <a:rPr lang="nl-NL" dirty="0" err="1" smtClean="0"/>
@@ -6867,7 +6978,7 @@
             </a:r>
             <a:r>
               <a:rPr lang="nl-NL" dirty="0" smtClean="0"/>
-              <a:t> account aan en stuur link naar mij (</a:t>
+              <a:t> account naar de docent (</a:t>
             </a:r>
             <a:r>
               <a:rPr lang="nl-NL" dirty="0" smtClean="0">
@@ -6918,7 +7029,7 @@
           <a:p>
             <a:r>
               <a:rPr lang="nl-NL" dirty="0" smtClean="0"/>
-              <a:t>3) Maak hoofdstuk 1 van de syllabus en zet het document met de antwoorden op de inleveropdracht in de </a:t>
+              <a:t>3) Maak hoofdstuk 1 van de syllabus en zet het document met de antwoorden op de inleveropdracht in je </a:t>
             </a:r>
             <a:r>
               <a:rPr lang="nl-NL" dirty="0" err="1" smtClean="0"/>
@@ -6932,7 +7043,7 @@
               <a:rPr lang="nl-NL" dirty="0" err="1" smtClean="0"/>
               <a:t>repository</a:t>
             </a:r>
-            <a:endParaRPr lang="nl-NL" smtClean="0"/>
+            <a:endParaRPr lang="nl-NL" dirty="0" smtClean="0"/>
           </a:p>
           <a:p>
             <a:endParaRPr lang="nl-NL" dirty="0"/>
@@ -6949,6 +7060,295 @@
   <p:clrMapOvr>
     <a:masterClrMapping/>
   </p:clrMapOvr>
+  <p:timing>
+    <p:tnLst>
+      <p:par>
+        <p:cTn xmlns:p14="http://schemas.microsoft.com/office/powerpoint/2010/main" id="1" dur="indefinite" restart="never" nodeType="tmRoot"/>
+      </p:par>
+    </p:tnLst>
+  </p:timing>
+</p:sld>
+</file>
+
+<file path=ppt/slides/slide14.xml><?xml version="1.0" encoding="utf-8"?>
+<p:sld xmlns:a="http://schemas.openxmlformats.org/drawingml/2006/main" xmlns:r="http://schemas.openxmlformats.org/officeDocument/2006/relationships" xmlns:p="http://schemas.openxmlformats.org/presentationml/2006/main">
+  <p:cSld>
+    <p:spTree>
+      <p:nvGrpSpPr>
+        <p:cNvPr id="1" name=""/>
+        <p:cNvGrpSpPr/>
+        <p:nvPr/>
+      </p:nvGrpSpPr>
+      <p:grpSpPr>
+        <a:xfrm>
+          <a:off x="0" y="0"/>
+          <a:ext cx="0" cy="0"/>
+          <a:chOff x="0" y="0"/>
+          <a:chExt cx="0" cy="0"/>
+        </a:xfrm>
+      </p:grpSpPr>
+      <p:sp>
+        <p:nvSpPr>
+          <p:cNvPr id="2" name="Titel 1"/>
+          <p:cNvSpPr>
+            <a:spLocks noGrp="1"/>
+          </p:cNvSpPr>
+          <p:nvPr>
+            <p:ph type="title"/>
+          </p:nvPr>
+        </p:nvSpPr>
+        <p:spPr/>
+        <p:txBody>
+          <a:bodyPr/>
+          <a:lstStyle/>
+          <a:p>
+            <a:r>
+              <a:rPr lang="nl-NL" dirty="0" smtClean="0"/>
+              <a:t>Mobile </a:t>
+            </a:r>
+            <a:r>
+              <a:rPr lang="nl-NL" dirty="0" err="1" smtClean="0"/>
+              <a:t>Devices</a:t>
+            </a:r>
+            <a:endParaRPr lang="nl-NL" dirty="0"/>
+          </a:p>
+        </p:txBody>
+      </p:sp>
+      <p:sp>
+        <p:nvSpPr>
+          <p:cNvPr id="3" name="Tijdelijke aanduiding voor inhoud 2"/>
+          <p:cNvSpPr>
+            <a:spLocks noGrp="1"/>
+          </p:cNvSpPr>
+          <p:nvPr>
+            <p:ph idx="1"/>
+          </p:nvPr>
+        </p:nvSpPr>
+        <p:spPr/>
+        <p:txBody>
+          <a:bodyPr/>
+          <a:lstStyle/>
+          <a:p>
+            <a:r>
+              <a:rPr lang="nl-NL" dirty="0" err="1" smtClean="0"/>
+              <a:t>Appinvento</a:t>
+            </a:r>
+            <a:r>
+              <a:rPr lang="nl-NL" dirty="0" err="1" smtClean="0"/>
+              <a:t>r</a:t>
+            </a:r>
+            <a:r>
+              <a:rPr lang="nl-NL" dirty="0" smtClean="0"/>
+              <a:t> (ter ondersteuning van project)</a:t>
+            </a:r>
+          </a:p>
+          <a:p>
+            <a:r>
+              <a:rPr lang="nl-NL" dirty="0" err="1" smtClean="0"/>
+              <a:t>Android</a:t>
+            </a:r>
+            <a:r>
+              <a:rPr lang="nl-NL" dirty="0" smtClean="0"/>
+              <a:t> Studio (maken </a:t>
+            </a:r>
+            <a:r>
+              <a:rPr lang="nl-NL" dirty="0" err="1" smtClean="0"/>
+              <a:t>Android</a:t>
+            </a:r>
+            <a:r>
+              <a:rPr lang="nl-NL" dirty="0" smtClean="0"/>
+              <a:t> </a:t>
+            </a:r>
+            <a:r>
+              <a:rPr lang="nl-NL" dirty="0" err="1" smtClean="0"/>
+              <a:t>apps</a:t>
+            </a:r>
+            <a:r>
+              <a:rPr lang="nl-NL" dirty="0" smtClean="0"/>
+              <a:t> </a:t>
+            </a:r>
+            <a:r>
+              <a:rPr lang="nl-NL" dirty="0" err="1" smtClean="0"/>
+              <a:t>mbv</a:t>
+            </a:r>
+            <a:r>
+              <a:rPr lang="nl-NL" dirty="0" smtClean="0"/>
+              <a:t> Java en XML)</a:t>
+            </a:r>
+          </a:p>
+          <a:p>
+            <a:endParaRPr lang="nl-NL" dirty="0"/>
+          </a:p>
+        </p:txBody>
+      </p:sp>
+    </p:spTree>
+    <p:extLst>
+      <p:ext uri="{BB962C8B-B14F-4D97-AF65-F5344CB8AC3E}">
+        <p14:creationId xmlns:p14="http://schemas.microsoft.com/office/powerpoint/2010/main" val="729344783"/>
+      </p:ext>
+    </p:extLst>
+  </p:cSld>
+  <p:clrMapOvr>
+    <a:masterClrMapping/>
+  </p:clrMapOvr>
+  <p:timing>
+    <p:tnLst>
+      <p:par>
+        <p:cTn xmlns:p14="http://schemas.microsoft.com/office/powerpoint/2010/main" id="1" dur="indefinite" restart="never" nodeType="tmRoot"/>
+      </p:par>
+    </p:tnLst>
+  </p:timing>
+</p:sld>
+</file>
+
+<file path=ppt/slides/slide15.xml><?xml version="1.0" encoding="utf-8"?>
+<p:sld xmlns:a="http://schemas.openxmlformats.org/drawingml/2006/main" xmlns:r="http://schemas.openxmlformats.org/officeDocument/2006/relationships" xmlns:p="http://schemas.openxmlformats.org/presentationml/2006/main">
+  <p:cSld>
+    <p:spTree>
+      <p:nvGrpSpPr>
+        <p:cNvPr id="1" name=""/>
+        <p:cNvGrpSpPr/>
+        <p:nvPr/>
+      </p:nvGrpSpPr>
+      <p:grpSpPr>
+        <a:xfrm>
+          <a:off x="0" y="0"/>
+          <a:ext cx="0" cy="0"/>
+          <a:chOff x="0" y="0"/>
+          <a:chExt cx="0" cy="0"/>
+        </a:xfrm>
+      </p:grpSpPr>
+      <p:sp>
+        <p:nvSpPr>
+          <p:cNvPr id="2" name="Titel 1"/>
+          <p:cNvSpPr>
+            <a:spLocks noGrp="1"/>
+          </p:cNvSpPr>
+          <p:nvPr>
+            <p:ph type="title"/>
+          </p:nvPr>
+        </p:nvSpPr>
+        <p:spPr/>
+        <p:txBody>
+          <a:bodyPr/>
+          <a:lstStyle/>
+          <a:p>
+            <a:r>
+              <a:rPr lang="nl-NL" dirty="0" err="1" smtClean="0"/>
+              <a:t>talkToMe</a:t>
+            </a:r>
+            <a:r>
+              <a:rPr lang="nl-NL" dirty="0" smtClean="0"/>
+              <a:t> </a:t>
+            </a:r>
+            <a:r>
+              <a:rPr lang="nl-NL" dirty="0" err="1" smtClean="0"/>
+              <a:t>app</a:t>
+            </a:r>
+            <a:endParaRPr lang="nl-NL" dirty="0"/>
+          </a:p>
+        </p:txBody>
+      </p:sp>
+      <p:sp>
+        <p:nvSpPr>
+          <p:cNvPr id="3" name="Tijdelijke aanduiding voor inhoud 2"/>
+          <p:cNvSpPr>
+            <a:spLocks noGrp="1"/>
+          </p:cNvSpPr>
+          <p:nvPr>
+            <p:ph idx="1"/>
+          </p:nvPr>
+        </p:nvSpPr>
+        <p:spPr/>
+        <p:txBody>
+          <a:bodyPr/>
+          <a:lstStyle/>
+          <a:p>
+            <a:r>
+              <a:rPr lang="nl-NL" dirty="0" err="1"/>
+              <a:t>talkToMe</a:t>
+            </a:r>
+            <a:r>
+              <a:rPr lang="nl-NL" dirty="0"/>
+              <a:t> </a:t>
+            </a:r>
+            <a:r>
+              <a:rPr lang="nl-NL" dirty="0" err="1"/>
+              <a:t>app</a:t>
+            </a:r>
+            <a:r>
+              <a:rPr lang="nl-NL" dirty="0"/>
+              <a:t> (http://</a:t>
+            </a:r>
+            <a:r>
+              <a:rPr lang="nl-NL" dirty="0" err="1"/>
+              <a:t>appinventor.mit.edu</a:t>
+            </a:r>
+            <a:r>
+              <a:rPr lang="nl-NL" dirty="0"/>
+              <a:t>/</a:t>
+            </a:r>
+            <a:r>
+              <a:rPr lang="nl-NL" dirty="0" err="1"/>
+              <a:t>explore</a:t>
+            </a:r>
+            <a:r>
+              <a:rPr lang="nl-NL" dirty="0"/>
+              <a:t>/ai2/beginner-</a:t>
+            </a:r>
+            <a:r>
+              <a:rPr lang="nl-NL" dirty="0" err="1"/>
+              <a:t>videos.html</a:t>
+            </a:r>
+            <a:r>
+              <a:rPr lang="nl-NL" dirty="0"/>
+              <a:t>) </a:t>
+            </a:r>
+            <a:endParaRPr lang="nl-NL" dirty="0" smtClean="0"/>
+          </a:p>
+          <a:p>
+            <a:endParaRPr lang="nl-NL" dirty="0"/>
+          </a:p>
+          <a:p>
+            <a:r>
+              <a:rPr lang="nl-NL" dirty="0">
+                <a:hlinkClick r:id="rId2"/>
+              </a:rPr>
+              <a:t>https://www.youtube.com/embed/Vdo8UdkgDD8?autoplay=</a:t>
+            </a:r>
+            <a:r>
+              <a:rPr lang="nl-NL" dirty="0" smtClean="0">
+                <a:hlinkClick r:id="rId2"/>
+              </a:rPr>
+              <a:t>1</a:t>
+            </a:r>
+            <a:endParaRPr lang="nl-NL" dirty="0" smtClean="0"/>
+          </a:p>
+          <a:p>
+            <a:endParaRPr lang="nl-NL" dirty="0"/>
+          </a:p>
+          <a:p>
+            <a:endParaRPr lang="nl-NL" dirty="0"/>
+          </a:p>
+        </p:txBody>
+      </p:sp>
+    </p:spTree>
+    <p:extLst>
+      <p:ext uri="{BB962C8B-B14F-4D97-AF65-F5344CB8AC3E}">
+        <p14:creationId xmlns:p14="http://schemas.microsoft.com/office/powerpoint/2010/main" val="2309081342"/>
+      </p:ext>
+    </p:extLst>
+  </p:cSld>
+  <p:clrMapOvr>
+    <a:masterClrMapping/>
+  </p:clrMapOvr>
+  <p:timing>
+    <p:tnLst>
+      <p:par>
+        <p:cTn xmlns:p14="http://schemas.microsoft.com/office/powerpoint/2010/main" id="1" dur="indefinite" restart="never" nodeType="tmRoot"/>
+      </p:par>
+    </p:tnLst>
+  </p:timing>
 </p:sld>
 </file>
 
@@ -7017,7 +7417,19 @@
               <a:rPr lang="nl-NL" dirty="0" smtClean="0">
                 <a:hlinkClick r:id="rId2"/>
               </a:rPr>
-              <a:t>k.hoogendorp@rocval.nl</a:t>
+              <a:t>k.hoogendorp</a:t>
+            </a:r>
+            <a:r>
+              <a:rPr lang="nl-NL" smtClean="0">
+                <a:hlinkClick r:id="rId2"/>
+              </a:rPr>
+              <a:t>@</a:t>
+            </a:r>
+            <a:r>
+              <a:rPr lang="nl-NL" smtClean="0">
+                <a:hlinkClick r:id="rId2"/>
+              </a:rPr>
+              <a:t>rocva.nl</a:t>
             </a:r>
             <a:r>
               <a:rPr lang="nl-NL" dirty="0" smtClean="0"/>
@@ -7087,6 +7499,13 @@
   <p:clrMapOvr>
     <a:masterClrMapping/>
   </p:clrMapOvr>
+  <p:timing>
+    <p:tnLst>
+      <p:par>
+        <p:cTn xmlns:p14="http://schemas.microsoft.com/office/powerpoint/2010/main" id="1" dur="indefinite" restart="never" nodeType="tmRoot"/>
+      </p:par>
+    </p:tnLst>
+  </p:timing>
 </p:sld>
 </file>
 
@@ -7238,6 +7657,13 @@
   <p:clrMapOvr>
     <a:masterClrMapping/>
   </p:clrMapOvr>
+  <p:timing>
+    <p:tnLst>
+      <p:par>
+        <p:cTn xmlns:p14="http://schemas.microsoft.com/office/powerpoint/2010/main" id="1" dur="indefinite" restart="never" nodeType="tmRoot"/>
+      </p:par>
+    </p:tnLst>
+  </p:timing>
 </p:sld>
 </file>
 
@@ -7386,6 +7812,13 @@
   <p:clrMapOvr>
     <a:masterClrMapping/>
   </p:clrMapOvr>
+  <p:timing>
+    <p:tnLst>
+      <p:par>
+        <p:cTn xmlns:p14="http://schemas.microsoft.com/office/powerpoint/2010/main" id="1" dur="indefinite" restart="never" nodeType="tmRoot"/>
+      </p:par>
+    </p:tnLst>
+  </p:timing>
 </p:sld>
 </file>
 
@@ -7523,6 +7956,13 @@
   <p:clrMapOvr>
     <a:masterClrMapping/>
   </p:clrMapOvr>
+  <p:timing>
+    <p:tnLst>
+      <p:par>
+        <p:cTn xmlns:p14="http://schemas.microsoft.com/office/powerpoint/2010/main" id="1" dur="indefinite" restart="never" nodeType="tmRoot"/>
+      </p:par>
+    </p:tnLst>
+  </p:timing>
 </p:sld>
 </file>
 
@@ -7618,6 +8058,13 @@
   <p:clrMapOvr>
     <a:masterClrMapping/>
   </p:clrMapOvr>
+  <p:timing>
+    <p:tnLst>
+      <p:par>
+        <p:cTn xmlns:p14="http://schemas.microsoft.com/office/powerpoint/2010/main" id="1" dur="indefinite" restart="never" nodeType="tmRoot"/>
+      </p:par>
+    </p:tnLst>
+  </p:timing>
 </p:sld>
 </file>
 
@@ -7853,6 +8300,13 @@
   <p:clrMapOvr>
     <a:masterClrMapping/>
   </p:clrMapOvr>
+  <p:timing>
+    <p:tnLst>
+      <p:par>
+        <p:cTn xmlns:p14="http://schemas.microsoft.com/office/powerpoint/2010/main" id="1" dur="indefinite" restart="never" nodeType="tmRoot"/>
+      </p:par>
+    </p:tnLst>
+  </p:timing>
 </p:sld>
 </file>
 

</xml_diff>